<commit_message>
Work on figures, extractions and overlays
</commit_message>
<xml_diff>
--- a/figures/Figure.pptx
+++ b/figures/Figure.pptx
@@ -6,6 +6,7 @@
   </p:sldMasterIdLst>
   <p:sldIdLst>
     <p:sldId id="256" r:id="rId2"/>
+    <p:sldId id="257" r:id="rId3"/>
   </p:sldIdLst>
   <p:sldSz cx="13679488" cy="9720263"/>
   <p:notesSz cx="6858000" cy="9144000"/>
@@ -254,7 +255,7 @@
           <a:p>
             <a:fld id="{A1834766-88F6-411A-AB82-D167DC2E77CF}" type="datetimeFigureOut">
               <a:rPr lang="en-GB" smtClean="0"/>
-              <a:t>16/04/2021</a:t>
+              <a:t>27/11/2022</a:t>
             </a:fld>
             <a:endParaRPr lang="en-GB"/>
           </a:p>
@@ -424,7 +425,7 @@
           <a:p>
             <a:fld id="{A1834766-88F6-411A-AB82-D167DC2E77CF}" type="datetimeFigureOut">
               <a:rPr lang="en-GB" smtClean="0"/>
-              <a:t>16/04/2021</a:t>
+              <a:t>27/11/2022</a:t>
             </a:fld>
             <a:endParaRPr lang="en-GB"/>
           </a:p>
@@ -604,7 +605,7 @@
           <a:p>
             <a:fld id="{A1834766-88F6-411A-AB82-D167DC2E77CF}" type="datetimeFigureOut">
               <a:rPr lang="en-GB" smtClean="0"/>
-              <a:t>16/04/2021</a:t>
+              <a:t>27/11/2022</a:t>
             </a:fld>
             <a:endParaRPr lang="en-GB"/>
           </a:p>
@@ -774,7 +775,7 @@
           <a:p>
             <a:fld id="{A1834766-88F6-411A-AB82-D167DC2E77CF}" type="datetimeFigureOut">
               <a:rPr lang="en-GB" smtClean="0"/>
-              <a:t>16/04/2021</a:t>
+              <a:t>27/11/2022</a:t>
             </a:fld>
             <a:endParaRPr lang="en-GB"/>
           </a:p>
@@ -1018,7 +1019,7 @@
           <a:p>
             <a:fld id="{A1834766-88F6-411A-AB82-D167DC2E77CF}" type="datetimeFigureOut">
               <a:rPr lang="en-GB" smtClean="0"/>
-              <a:t>16/04/2021</a:t>
+              <a:t>27/11/2022</a:t>
             </a:fld>
             <a:endParaRPr lang="en-GB"/>
           </a:p>
@@ -1250,7 +1251,7 @@
           <a:p>
             <a:fld id="{A1834766-88F6-411A-AB82-D167DC2E77CF}" type="datetimeFigureOut">
               <a:rPr lang="en-GB" smtClean="0"/>
-              <a:t>16/04/2021</a:t>
+              <a:t>27/11/2022</a:t>
             </a:fld>
             <a:endParaRPr lang="en-GB"/>
           </a:p>
@@ -1617,7 +1618,7 @@
           <a:p>
             <a:fld id="{A1834766-88F6-411A-AB82-D167DC2E77CF}" type="datetimeFigureOut">
               <a:rPr lang="en-GB" smtClean="0"/>
-              <a:t>16/04/2021</a:t>
+              <a:t>27/11/2022</a:t>
             </a:fld>
             <a:endParaRPr lang="en-GB"/>
           </a:p>
@@ -1735,7 +1736,7 @@
           <a:p>
             <a:fld id="{A1834766-88F6-411A-AB82-D167DC2E77CF}" type="datetimeFigureOut">
               <a:rPr lang="en-GB" smtClean="0"/>
-              <a:t>16/04/2021</a:t>
+              <a:t>27/11/2022</a:t>
             </a:fld>
             <a:endParaRPr lang="en-GB"/>
           </a:p>
@@ -1830,7 +1831,7 @@
           <a:p>
             <a:fld id="{A1834766-88F6-411A-AB82-D167DC2E77CF}" type="datetimeFigureOut">
               <a:rPr lang="en-GB" smtClean="0"/>
-              <a:t>16/04/2021</a:t>
+              <a:t>27/11/2022</a:t>
             </a:fld>
             <a:endParaRPr lang="en-GB"/>
           </a:p>
@@ -2107,7 +2108,7 @@
           <a:p>
             <a:fld id="{A1834766-88F6-411A-AB82-D167DC2E77CF}" type="datetimeFigureOut">
               <a:rPr lang="en-GB" smtClean="0"/>
-              <a:t>16/04/2021</a:t>
+              <a:t>27/11/2022</a:t>
             </a:fld>
             <a:endParaRPr lang="en-GB"/>
           </a:p>
@@ -2364,7 +2365,7 @@
           <a:p>
             <a:fld id="{A1834766-88F6-411A-AB82-D167DC2E77CF}" type="datetimeFigureOut">
               <a:rPr lang="en-GB" smtClean="0"/>
-              <a:t>16/04/2021</a:t>
+              <a:t>27/11/2022</a:t>
             </a:fld>
             <a:endParaRPr lang="en-GB"/>
           </a:p>
@@ -2577,7 +2578,7 @@
           <a:p>
             <a:fld id="{A1834766-88F6-411A-AB82-D167DC2E77CF}" type="datetimeFigureOut">
               <a:rPr lang="en-GB" smtClean="0"/>
-              <a:t>16/04/2021</a:t>
+              <a:t>27/11/2022</a:t>
             </a:fld>
             <a:endParaRPr lang="en-GB"/>
           </a:p>
@@ -3217,6 +3218,298 @@
 </p:sld>
 </file>
 
+<file path=ppt/slides/slide2.xml><?xml version="1.0" encoding="utf-8"?>
+<p:sld xmlns:a="http://schemas.openxmlformats.org/drawingml/2006/main" xmlns:r="http://schemas.openxmlformats.org/officeDocument/2006/relationships" xmlns:p="http://schemas.openxmlformats.org/presentationml/2006/main">
+  <p:cSld>
+    <p:spTree>
+      <p:nvGrpSpPr>
+        <p:cNvPr id="1" name=""/>
+        <p:cNvGrpSpPr/>
+        <p:nvPr/>
+      </p:nvGrpSpPr>
+      <p:grpSpPr>
+        <a:xfrm>
+          <a:off x="0" y="0"/>
+          <a:ext cx="0" cy="0"/>
+          <a:chOff x="0" y="0"/>
+          <a:chExt cx="0" cy="0"/>
+        </a:xfrm>
+      </p:grpSpPr>
+      <p:pic>
+        <p:nvPicPr>
+          <p:cNvPr id="7" name="Picture 6">
+            <a:extLst>
+              <a:ext uri="{FF2B5EF4-FFF2-40B4-BE49-F238E27FC236}">
+                <a16:creationId xmlns:a16="http://schemas.microsoft.com/office/drawing/2014/main" id="{DC7B316E-2E72-4294-9245-46A3AA932856}"/>
+              </a:ext>
+            </a:extLst>
+          </p:cNvPr>
+          <p:cNvPicPr>
+            <a:picLocks noChangeAspect="1"/>
+          </p:cNvPicPr>
+          <p:nvPr/>
+        </p:nvPicPr>
+        <p:blipFill>
+          <a:blip r:embed="rId2">
+            <a:extLst>
+              <a:ext uri="{28A0092B-C50C-407E-A947-70E740481C1C}">
+                <a14:useLocalDpi xmlns:a14="http://schemas.microsoft.com/office/drawing/2010/main" val="0"/>
+              </a:ext>
+            </a:extLst>
+          </a:blip>
+          <a:srcRect/>
+          <a:stretch/>
+        </p:blipFill>
+        <p:spPr>
+          <a:xfrm>
+            <a:off x="11451" y="4860136"/>
+            <a:ext cx="9720262" cy="4860131"/>
+          </a:xfrm>
+          <a:prstGeom prst="rect">
+            <a:avLst/>
+          </a:prstGeom>
+        </p:spPr>
+      </p:pic>
+      <p:pic>
+        <p:nvPicPr>
+          <p:cNvPr id="9" name="Picture 8">
+            <a:extLst>
+              <a:ext uri="{FF2B5EF4-FFF2-40B4-BE49-F238E27FC236}">
+                <a16:creationId xmlns:a16="http://schemas.microsoft.com/office/drawing/2014/main" id="{3A6D5F1F-350A-4D3E-9568-152B7A2C0F6B}"/>
+              </a:ext>
+            </a:extLst>
+          </p:cNvPr>
+          <p:cNvPicPr>
+            <a:picLocks noChangeAspect="1"/>
+          </p:cNvPicPr>
+          <p:nvPr/>
+        </p:nvPicPr>
+        <p:blipFill>
+          <a:blip r:embed="rId3">
+            <a:extLst>
+              <a:ext uri="{28A0092B-C50C-407E-A947-70E740481C1C}">
+                <a14:useLocalDpi xmlns:a14="http://schemas.microsoft.com/office/drawing/2010/main" val="0"/>
+              </a:ext>
+            </a:extLst>
+          </a:blip>
+          <a:srcRect/>
+          <a:stretch/>
+        </p:blipFill>
+        <p:spPr>
+          <a:xfrm>
+            <a:off x="11451" y="5"/>
+            <a:ext cx="9721055" cy="4874414"/>
+          </a:xfrm>
+          <a:prstGeom prst="rect">
+            <a:avLst/>
+          </a:prstGeom>
+        </p:spPr>
+      </p:pic>
+      <p:sp>
+        <p:nvSpPr>
+          <p:cNvPr id="10" name="TextBox 9">
+            <a:extLst>
+              <a:ext uri="{FF2B5EF4-FFF2-40B4-BE49-F238E27FC236}">
+                <a16:creationId xmlns:a16="http://schemas.microsoft.com/office/drawing/2014/main" id="{1D02A8C6-16BF-4200-9D26-976DA3425A03}"/>
+              </a:ext>
+            </a:extLst>
+          </p:cNvPr>
+          <p:cNvSpPr txBox="1"/>
+          <p:nvPr/>
+        </p:nvSpPr>
+        <p:spPr>
+          <a:xfrm>
+            <a:off x="123076" y="14288"/>
+            <a:ext cx="665018" cy="584775"/>
+          </a:xfrm>
+          <a:prstGeom prst="rect">
+            <a:avLst/>
+          </a:prstGeom>
+          <a:noFill/>
+        </p:spPr>
+        <p:txBody>
+          <a:bodyPr wrap="square" rtlCol="0">
+            <a:spAutoFit/>
+          </a:bodyPr>
+          <a:lstStyle/>
+          <a:p>
+            <a:r>
+              <a:rPr lang="en-GB" sz="3200" b="1" dirty="0">
+                <a:latin typeface="Arial" panose="020B0604020202020204" pitchFamily="34" charset="0"/>
+                <a:ea typeface="Tahoma" panose="020B0604030504040204" pitchFamily="34" charset="0"/>
+                <a:cs typeface="Arial" panose="020B0604020202020204" pitchFamily="34" charset="0"/>
+              </a:rPr>
+              <a:t>a</a:t>
+            </a:r>
+          </a:p>
+        </p:txBody>
+      </p:sp>
+      <p:sp>
+        <p:nvSpPr>
+          <p:cNvPr id="11" name="TextBox 10">
+            <a:extLst>
+              <a:ext uri="{FF2B5EF4-FFF2-40B4-BE49-F238E27FC236}">
+                <a16:creationId xmlns:a16="http://schemas.microsoft.com/office/drawing/2014/main" id="{13CBBB52-BBFD-4F60-A9BF-41D604D2ED80}"/>
+              </a:ext>
+            </a:extLst>
+          </p:cNvPr>
+          <p:cNvSpPr txBox="1"/>
+          <p:nvPr/>
+        </p:nvSpPr>
+        <p:spPr>
+          <a:xfrm>
+            <a:off x="123076" y="4567748"/>
+            <a:ext cx="665018" cy="584775"/>
+          </a:xfrm>
+          <a:prstGeom prst="rect">
+            <a:avLst/>
+          </a:prstGeom>
+          <a:noFill/>
+        </p:spPr>
+        <p:txBody>
+          <a:bodyPr wrap="square" rtlCol="0">
+            <a:spAutoFit/>
+          </a:bodyPr>
+          <a:lstStyle/>
+          <a:p>
+            <a:r>
+              <a:rPr lang="en-GB" sz="3200" b="1" dirty="0">
+                <a:latin typeface="Arial" panose="020B0604020202020204" pitchFamily="34" charset="0"/>
+                <a:ea typeface="Tahoma" panose="020B0604030504040204" pitchFamily="34" charset="0"/>
+                <a:cs typeface="Arial" panose="020B0604020202020204" pitchFamily="34" charset="0"/>
+              </a:rPr>
+              <a:t>b</a:t>
+            </a:r>
+          </a:p>
+        </p:txBody>
+      </p:sp>
+      <p:sp>
+        <p:nvSpPr>
+          <p:cNvPr id="12" name="TextBox 11">
+            <a:extLst>
+              <a:ext uri="{FF2B5EF4-FFF2-40B4-BE49-F238E27FC236}">
+                <a16:creationId xmlns:a16="http://schemas.microsoft.com/office/drawing/2014/main" id="{3FBAA2EE-01E4-4313-848A-6AF4A78EB58B}"/>
+              </a:ext>
+            </a:extLst>
+          </p:cNvPr>
+          <p:cNvSpPr txBox="1"/>
+          <p:nvPr/>
+        </p:nvSpPr>
+        <p:spPr>
+          <a:xfrm>
+            <a:off x="9280931" y="0"/>
+            <a:ext cx="665018" cy="584775"/>
+          </a:xfrm>
+          <a:prstGeom prst="rect">
+            <a:avLst/>
+          </a:prstGeom>
+          <a:noFill/>
+        </p:spPr>
+        <p:txBody>
+          <a:bodyPr wrap="square" rtlCol="0">
+            <a:spAutoFit/>
+          </a:bodyPr>
+          <a:lstStyle/>
+          <a:p>
+            <a:r>
+              <a:rPr lang="en-GB" sz="3200" b="1" dirty="0">
+                <a:latin typeface="Arial" panose="020B0604020202020204" pitchFamily="34" charset="0"/>
+                <a:ea typeface="Tahoma" panose="020B0604030504040204" pitchFamily="34" charset="0"/>
+                <a:cs typeface="Arial" panose="020B0604020202020204" pitchFamily="34" charset="0"/>
+              </a:rPr>
+              <a:t>c</a:t>
+            </a:r>
+          </a:p>
+        </p:txBody>
+      </p:sp>
+      <p:pic>
+        <p:nvPicPr>
+          <p:cNvPr id="21" name="Picture 20">
+            <a:extLst>
+              <a:ext uri="{FF2B5EF4-FFF2-40B4-BE49-F238E27FC236}">
+                <a16:creationId xmlns:a16="http://schemas.microsoft.com/office/drawing/2014/main" id="{1B1A8153-43BF-7526-DF6D-135706CDDDFC}"/>
+              </a:ext>
+            </a:extLst>
+          </p:cNvPr>
+          <p:cNvPicPr>
+            <a:picLocks noChangeAspect="1"/>
+          </p:cNvPicPr>
+          <p:nvPr/>
+        </p:nvPicPr>
+        <p:blipFill>
+          <a:blip r:embed="rId4">
+            <a:extLst>
+              <a:ext uri="{28A0092B-C50C-407E-A947-70E740481C1C}">
+                <a14:useLocalDpi xmlns:a14="http://schemas.microsoft.com/office/drawing/2010/main" val="0"/>
+              </a:ext>
+            </a:extLst>
+          </a:blip>
+          <a:stretch>
+            <a:fillRect/>
+          </a:stretch>
+        </p:blipFill>
+        <p:spPr>
+          <a:xfrm>
+            <a:off x="9736240" y="172757"/>
+            <a:ext cx="3820172" cy="4258795"/>
+          </a:xfrm>
+          <a:prstGeom prst="rect">
+            <a:avLst/>
+          </a:prstGeom>
+        </p:spPr>
+      </p:pic>
+      <p:sp>
+        <p:nvSpPr>
+          <p:cNvPr id="22" name="TextBox 21">
+            <a:extLst>
+              <a:ext uri="{FF2B5EF4-FFF2-40B4-BE49-F238E27FC236}">
+                <a16:creationId xmlns:a16="http://schemas.microsoft.com/office/drawing/2014/main" id="{985B3DDB-5265-C354-8A8B-19782BA45032}"/>
+              </a:ext>
+            </a:extLst>
+          </p:cNvPr>
+          <p:cNvSpPr txBox="1"/>
+          <p:nvPr/>
+        </p:nvSpPr>
+        <p:spPr>
+          <a:xfrm>
+            <a:off x="11511856" y="2437212"/>
+            <a:ext cx="1910086" cy="1631216"/>
+          </a:xfrm>
+          <a:prstGeom prst="rect">
+            <a:avLst/>
+          </a:prstGeom>
+          <a:noFill/>
+        </p:spPr>
+        <p:txBody>
+          <a:bodyPr wrap="square" rtlCol="0">
+            <a:spAutoFit/>
+          </a:bodyPr>
+          <a:lstStyle/>
+          <a:p>
+            <a:pPr algn="r"/>
+            <a:r>
+              <a:rPr lang="en-GB" sz="2000" dirty="0">
+                <a:latin typeface="Arial" panose="020B0604020202020204" pitchFamily="34" charset="0"/>
+                <a:cs typeface="Arial" panose="020B0604020202020204" pitchFamily="34" charset="0"/>
+              </a:rPr>
+              <a:t>Tree cover gains in countries with restoration pledges</a:t>
+            </a:r>
+          </a:p>
+        </p:txBody>
+      </p:sp>
+    </p:spTree>
+    <p:extLst>
+      <p:ext uri="{BB962C8B-B14F-4D97-AF65-F5344CB8AC3E}">
+        <p14:creationId xmlns:p14="http://schemas.microsoft.com/office/powerpoint/2010/main" val="146283309"/>
+      </p:ext>
+    </p:extLst>
+  </p:cSld>
+  <p:clrMapOvr>
+    <a:masterClrMapping/>
+  </p:clrMapOvr>
+</p:sld>
+</file>
+
 <file path=ppt/theme/theme1.xml><?xml version="1.0" encoding="utf-8"?>
 <a:theme xmlns:a="http://schemas.openxmlformats.org/drawingml/2006/main" name="Office Theme">
   <a:themeElements>

</xml_diff>